<commit_message>
Fix: Per-tab DLT port tracking via sessionStorage - prevents cross-tab port overwrites
</commit_message>
<xml_diff>
--- a/Telephony_Manager_Demo_Light.pptx
+++ b/Telephony_Manager_Demo_Light.pptx
@@ -298,7 +298,7 @@
           <a:p>
             <a:fld id="{5BCAD085-E8A6-8845-BD4E-CB4CCA059FC4}" type="datetimeFigureOut">
               <a:rPr lang="en-US" smtClean="0"/>
-              <a:t>2/12/2026</a:t>
+              <a:t>2/13/2026</a:t>
             </a:fld>
             <a:endParaRPr lang="en-US"/>
           </a:p>
@@ -468,7 +468,7 @@
           <a:p>
             <a:fld id="{5BCAD085-E8A6-8845-BD4E-CB4CCA059FC4}" type="datetimeFigureOut">
               <a:rPr lang="en-US" smtClean="0"/>
-              <a:t>2/12/2026</a:t>
+              <a:t>2/13/2026</a:t>
             </a:fld>
             <a:endParaRPr lang="en-US"/>
           </a:p>
@@ -648,7 +648,7 @@
           <a:p>
             <a:fld id="{5BCAD085-E8A6-8845-BD4E-CB4CCA059FC4}" type="datetimeFigureOut">
               <a:rPr lang="en-US" smtClean="0"/>
-              <a:t>2/12/2026</a:t>
+              <a:t>2/13/2026</a:t>
             </a:fld>
             <a:endParaRPr lang="en-US"/>
           </a:p>
@@ -818,7 +818,7 @@
           <a:p>
             <a:fld id="{5BCAD085-E8A6-8845-BD4E-CB4CCA059FC4}" type="datetimeFigureOut">
               <a:rPr lang="en-US" smtClean="0"/>
-              <a:t>2/12/2026</a:t>
+              <a:t>2/13/2026</a:t>
             </a:fld>
             <a:endParaRPr lang="en-US"/>
           </a:p>
@@ -1064,7 +1064,7 @@
           <a:p>
             <a:fld id="{5BCAD085-E8A6-8845-BD4E-CB4CCA059FC4}" type="datetimeFigureOut">
               <a:rPr lang="en-US" smtClean="0"/>
-              <a:t>2/12/2026</a:t>
+              <a:t>2/13/2026</a:t>
             </a:fld>
             <a:endParaRPr lang="en-US"/>
           </a:p>
@@ -1352,7 +1352,7 @@
           <a:p>
             <a:fld id="{5BCAD085-E8A6-8845-BD4E-CB4CCA059FC4}" type="datetimeFigureOut">
               <a:rPr lang="en-US" smtClean="0"/>
-              <a:t>2/12/2026</a:t>
+              <a:t>2/13/2026</a:t>
             </a:fld>
             <a:endParaRPr lang="en-US"/>
           </a:p>
@@ -1774,7 +1774,7 @@
           <a:p>
             <a:fld id="{5BCAD085-E8A6-8845-BD4E-CB4CCA059FC4}" type="datetimeFigureOut">
               <a:rPr lang="en-US" smtClean="0"/>
-              <a:t>2/12/2026</a:t>
+              <a:t>2/13/2026</a:t>
             </a:fld>
             <a:endParaRPr lang="en-US"/>
           </a:p>
@@ -1892,7 +1892,7 @@
           <a:p>
             <a:fld id="{5BCAD085-E8A6-8845-BD4E-CB4CCA059FC4}" type="datetimeFigureOut">
               <a:rPr lang="en-US" smtClean="0"/>
-              <a:t>2/12/2026</a:t>
+              <a:t>2/13/2026</a:t>
             </a:fld>
             <a:endParaRPr lang="en-US"/>
           </a:p>
@@ -1987,7 +1987,7 @@
           <a:p>
             <a:fld id="{5BCAD085-E8A6-8845-BD4E-CB4CCA059FC4}" type="datetimeFigureOut">
               <a:rPr lang="en-US" smtClean="0"/>
-              <a:t>2/12/2026</a:t>
+              <a:t>2/13/2026</a:t>
             </a:fld>
             <a:endParaRPr lang="en-US"/>
           </a:p>
@@ -2264,7 +2264,7 @@
           <a:p>
             <a:fld id="{5BCAD085-E8A6-8845-BD4E-CB4CCA059FC4}" type="datetimeFigureOut">
               <a:rPr lang="en-US" smtClean="0"/>
-              <a:t>2/12/2026</a:t>
+              <a:t>2/13/2026</a:t>
             </a:fld>
             <a:endParaRPr lang="en-US"/>
           </a:p>
@@ -2517,7 +2517,7 @@
           <a:p>
             <a:fld id="{5BCAD085-E8A6-8845-BD4E-CB4CCA059FC4}" type="datetimeFigureOut">
               <a:rPr lang="en-US" smtClean="0"/>
-              <a:t>2/12/2026</a:t>
+              <a:t>2/13/2026</a:t>
             </a:fld>
             <a:endParaRPr lang="en-US"/>
           </a:p>
@@ -2730,7 +2730,7 @@
           <a:p>
             <a:fld id="{5BCAD085-E8A6-8845-BD4E-CB4CCA059FC4}" type="datetimeFigureOut">
               <a:rPr lang="en-US" smtClean="0"/>
-              <a:t>2/12/2026</a:t>
+              <a:t>2/13/2026</a:t>
             </a:fld>
             <a:endParaRPr lang="en-US"/>
           </a:p>
@@ -3190,6 +3190,7 @@
               </a:defRPr>
             </a:pPr>
             <a:r>
+              <a:rPr dirty="0"/>
               <a:t>TELEPHONY MANAGER</a:t>
             </a:r>
           </a:p>
@@ -5598,8 +5599,8 @@
         </p:nvSpPr>
         <p:spPr>
           <a:xfrm>
-            <a:off x="548640" y="914400"/>
-            <a:ext cx="1828800" cy="36576"/>
+            <a:off x="548639" y="914399"/>
+            <a:ext cx="7686675" cy="45719"/>
           </a:xfrm>
           <a:prstGeom prst="roundRect">
             <a:avLst/>

</xml_diff>